<commit_message>
Push transition, content container added for slide
</commit_message>
<xml_diff>
--- a/Examples/Data/demo-transitions.pptx
+++ b/Examples/Data/demo-transitions.pptx
@@ -2504,12 +2504,12 @@
   </p:clrMapOvr>
   <mc:AlternateContent xmlns:mc="http://schemas.openxmlformats.org/markup-compatibility/2006" xmlns:p14="http://schemas.microsoft.com/office/powerpoint/2010/main">
     <mc:Choice Requires="p14">
-      <p:transition spd="med" p14:dur="700">
+      <p:transition spd="slow" p14:dur="5000">
         <p:fade/>
       </p:transition>
     </mc:Choice>
     <mc:Fallback xmlns="">
-      <p:transition spd="med">
+      <p:transition spd="slow">
         <p:fade/>
       </p:transition>
     </mc:Fallback>

</xml_diff>

<commit_message>
Push transition with content change, enabling/disabling buttons on animation
</commit_message>
<xml_diff>
--- a/Examples/Data/demo-transitions.pptx
+++ b/Examples/Data/demo-transitions.pptx
@@ -253,7 +253,7 @@
           <a:p>
             <a:fld id="{80680FBE-A8DF-4758-9AC4-3A9E1039168F}" type="datetimeFigureOut">
               <a:rPr lang="en-US" smtClean="0"/>
-              <a:t>12/23/2020</a:t>
+              <a:t>12/24/2020</a:t>
             </a:fld>
             <a:endParaRPr lang="en-US" dirty="0"/>
           </a:p>
@@ -418,7 +418,7 @@
           <a:p>
             <a:fld id="{EC13577B-6902-467D-A26C-08A0DD5E4E03}" type="datetimeFigureOut">
               <a:rPr lang="en-US" smtClean="0"/>
-              <a:t>12/23/2020</a:t>
+              <a:t>12/24/2020</a:t>
             </a:fld>
             <a:endParaRPr lang="en-US" dirty="0"/>
           </a:p>
@@ -1310,7 +1310,7 @@
             <a:fld id="{8BEEBAAA-29B5-4AF5-BC5F-7E580C29002D}" type="datetimeFigureOut">
               <a:rPr lang="en-US" smtClean="0"/>
               <a:pPr/>
-              <a:t>12/23/2020</a:t>
+              <a:t>12/24/2020</a:t>
             </a:fld>
             <a:endParaRPr lang="en-US" dirty="0"/>
           </a:p>
@@ -1936,7 +1936,7 @@
             <a:fld id="{8BEEBAAA-29B5-4AF5-BC5F-7E580C29002D}" type="datetimeFigureOut">
               <a:rPr lang="en-US" smtClean="0"/>
               <a:pPr/>
-              <a:t>12/23/2020</a:t>
+              <a:t>12/24/2020</a:t>
             </a:fld>
             <a:endParaRPr lang="en-US" dirty="0"/>
           </a:p>
@@ -2502,18 +2502,9 @@
   <p:clrMapOvr>
     <a:masterClrMapping/>
   </p:clrMapOvr>
-  <mc:AlternateContent xmlns:mc="http://schemas.openxmlformats.org/markup-compatibility/2006" xmlns:p14="http://schemas.microsoft.com/office/powerpoint/2010/main">
-    <mc:Choice Requires="p14">
-      <p:transition spd="slow" p14:dur="5000">
-        <p:fade/>
-      </p:transition>
-    </mc:Choice>
-    <mc:Fallback xmlns="">
-      <p:transition spd="slow">
-        <p:fade/>
-      </p:transition>
-    </mc:Fallback>
-  </mc:AlternateContent>
+  <p:transition spd="slow">
+    <p:fade/>
+  </p:transition>
   <p:timing>
     <p:tnLst>
       <p:par>
@@ -5140,7 +5131,7 @@
                 <p14:media xmlns:p14="http://schemas.microsoft.com/office/powerpoint/2010/main" r:embed="rId1">
                   <p14:extLst>
                     <p:ext uri="{3AFAAA56-56D3-431D-BCD4-E75A35582382}">
-                      <p173:tracksInfo xmlns="" xmlns:p173="http://schemas.microsoft.com/office/powerpoint/2017/3/main" displayLoc="media">
+                      <p173:tracksInfo xmlns:p173="http://schemas.microsoft.com/office/powerpoint/2017/3/main" xmlns="" displayLoc="media">
                         <p173:trackLst>
                           <p173:track id="{7D80394A-61EE-4513-90D2-E9A3DA581656}" label="caption" lang="" r:embed="rId4"/>
                         </p173:trackLst>
@@ -9351,7 +9342,7 @@
           <a:effectLst/>
           <a:extLst>
             <a:ext uri="{C572A759-6A51-4108-AA02-DFA0A04FC94B}">
-              <ma14:wrappingTextBoxFlag xmlns:ma14="http://schemas.microsoft.com/office/mac/drawingml/2011/main" xmlns=""/>
+              <ma14:wrappingTextBoxFlag xmlns="" xmlns:ma14="http://schemas.microsoft.com/office/mac/drawingml/2011/main"/>
             </a:ext>
           </a:extLst>
         </p:spPr>
@@ -13243,21 +13234,21 @@
 </file>
 
 <file path=customXml/item2.xml><?xml version="1.0" encoding="utf-8"?>
+<p:properties xmlns:p="http://schemas.microsoft.com/office/2006/metadata/properties" xmlns:xsi="http://www.w3.org/2001/XMLSchema-instance" xmlns:pc="http://schemas.microsoft.com/office/infopath/2007/PartnerControls">
+  <documentManagement>
+    <Status xmlns="71af3243-3dd4-4a8d-8c0d-dd76da1f02a5">Not started</Status>
+    <MediaServiceKeyPoints xmlns="71af3243-3dd4-4a8d-8c0d-dd76da1f02a5" xsi:nil="true"/>
+  </documentManagement>
+</p:properties>
+</file>
+
+<file path=customXml/item3.xml><?xml version="1.0" encoding="utf-8"?>
 <?mso-contentType ?>
 <FormTemplates xmlns="http://schemas.microsoft.com/sharepoint/v3/contenttype/forms">
   <Display>DocumentLibraryForm</Display>
   <Edit>DocumentLibraryForm</Edit>
   <New>DocumentLibraryForm</New>
 </FormTemplates>
-</file>
-
-<file path=customXml/item3.xml><?xml version="1.0" encoding="utf-8"?>
-<p:properties xmlns:p="http://schemas.microsoft.com/office/2006/metadata/properties" xmlns:xsi="http://www.w3.org/2001/XMLSchema-instance" xmlns:pc="http://schemas.microsoft.com/office/infopath/2007/PartnerControls">
-  <documentManagement>
-    <Status xmlns="71af3243-3dd4-4a8d-8c0d-dd76da1f02a5">Not started</Status>
-    <MediaServiceKeyPoints xmlns="71af3243-3dd4-4a8d-8c0d-dd76da1f02a5" xsi:nil="true"/>
-  </documentManagement>
-</p:properties>
 </file>
 
 <file path=customXml/itemProps1.xml><?xml version="1.0" encoding="utf-8"?>
@@ -13280,14 +13271,6 @@
 </file>
 
 <file path=customXml/itemProps2.xml><?xml version="1.0" encoding="utf-8"?>
-<ds:datastoreItem xmlns:ds="http://schemas.openxmlformats.org/officeDocument/2006/customXml" ds:itemID="{7EE8C63A-4744-4DE4-BB49-0FF0B5375C60}">
-  <ds:schemaRefs>
-    <ds:schemaRef ds:uri="http://schemas.microsoft.com/sharepoint/v3/contenttype/forms"/>
-  </ds:schemaRefs>
-</ds:datastoreItem>
-</file>
-
-<file path=customXml/itemProps3.xml><?xml version="1.0" encoding="utf-8"?>
 <ds:datastoreItem xmlns:ds="http://schemas.openxmlformats.org/officeDocument/2006/customXml" ds:itemID="{950072C5-DDE0-4258-BA7A-4D4B80DFA632}">
   <ds:schemaRefs>
     <ds:schemaRef ds:uri="http://schemas.microsoft.com/office/infopath/2007/PartnerControls"/>
@@ -13302,4 +13285,12 @@
     <ds:schemaRef ds:uri="http://purl.org/dc/dcmitype/"/>
   </ds:schemaRefs>
 </ds:datastoreItem>
+</file>
+
+<file path=customXml/itemProps3.xml><?xml version="1.0" encoding="utf-8"?>
+<ds:datastoreItem xmlns:ds="http://schemas.openxmlformats.org/officeDocument/2006/customXml" ds:itemID="{7EE8C63A-4744-4DE4-BB49-0FF0B5375C60}">
+  <ds:schemaRefs>
+    <ds:schemaRef ds:uri="http://schemas.microsoft.com/sharepoint/v3/contenttype/forms"/>
+  </ds:schemaRefs>
+</ds:datastoreItem>
 </file>
</xml_diff>

<commit_message>
Master and layout non-placeholder shapes
</commit_message>
<xml_diff>
--- a/Examples/Data/demo-transitions.pptx
+++ b/Examples/Data/demo-transitions.pptx
@@ -4912,14 +4912,9 @@
   <p:clrMapOvr>
     <a:masterClrMapping/>
   </p:clrMapOvr>
-  <mc:AlternateContent xmlns:mc="http://schemas.openxmlformats.org/markup-compatibility/2006" xmlns:p14="http://schemas.microsoft.com/office/powerpoint/2010/main">
-    <mc:Choice Requires="p14">
-      <p:transition p14:dur="10"/>
-    </mc:Choice>
-    <mc:Fallback xmlns="">
-      <p:transition/>
-    </mc:Fallback>
-  </mc:AlternateContent>
+  <p:transition spd="slow">
+    <p:wipe/>
+  </p:transition>
   <p:timing>
     <p:tnLst>
       <p:par>
@@ -5131,7 +5126,7 @@
                 <p14:media xmlns:p14="http://schemas.microsoft.com/office/powerpoint/2010/main" r:embed="rId1">
                   <p14:extLst>
                     <p:ext uri="{3AFAAA56-56D3-431D-BCD4-E75A35582382}">
-                      <p173:tracksInfo xmlns:p173="http://schemas.microsoft.com/office/powerpoint/2017/3/main" xmlns="" displayLoc="media">
+                      <p173:tracksInfo xmlns="" xmlns:p173="http://schemas.microsoft.com/office/powerpoint/2017/3/main" displayLoc="media">
                         <p173:trackLst>
                           <p173:track id="{7D80394A-61EE-4513-90D2-E9A3DA581656}" label="caption" lang="" r:embed="rId4"/>
                         </p173:trackLst>
@@ -9342,7 +9337,7 @@
           <a:effectLst/>
           <a:extLst>
             <a:ext uri="{C572A759-6A51-4108-AA02-DFA0A04FC94B}">
-              <ma14:wrappingTextBoxFlag xmlns="" xmlns:ma14="http://schemas.microsoft.com/office/mac/drawingml/2011/main"/>
+              <ma14:wrappingTextBoxFlag xmlns:ma14="http://schemas.microsoft.com/office/mac/drawingml/2011/main" xmlns=""/>
             </a:ext>
           </a:extLst>
         </p:spPr>
@@ -13234,21 +13229,21 @@
 </file>
 
 <file path=customXml/item2.xml><?xml version="1.0" encoding="utf-8"?>
+<?mso-contentType ?>
+<FormTemplates xmlns="http://schemas.microsoft.com/sharepoint/v3/contenttype/forms">
+  <Display>DocumentLibraryForm</Display>
+  <Edit>DocumentLibraryForm</Edit>
+  <New>DocumentLibraryForm</New>
+</FormTemplates>
+</file>
+
+<file path=customXml/item3.xml><?xml version="1.0" encoding="utf-8"?>
 <p:properties xmlns:p="http://schemas.microsoft.com/office/2006/metadata/properties" xmlns:xsi="http://www.w3.org/2001/XMLSchema-instance" xmlns:pc="http://schemas.microsoft.com/office/infopath/2007/PartnerControls">
   <documentManagement>
     <Status xmlns="71af3243-3dd4-4a8d-8c0d-dd76da1f02a5">Not started</Status>
     <MediaServiceKeyPoints xmlns="71af3243-3dd4-4a8d-8c0d-dd76da1f02a5" xsi:nil="true"/>
   </documentManagement>
 </p:properties>
-</file>
-
-<file path=customXml/item3.xml><?xml version="1.0" encoding="utf-8"?>
-<?mso-contentType ?>
-<FormTemplates xmlns="http://schemas.microsoft.com/sharepoint/v3/contenttype/forms">
-  <Display>DocumentLibraryForm</Display>
-  <Edit>DocumentLibraryForm</Edit>
-  <New>DocumentLibraryForm</New>
-</FormTemplates>
 </file>
 
 <file path=customXml/itemProps1.xml><?xml version="1.0" encoding="utf-8"?>
@@ -13271,6 +13266,14 @@
 </file>
 
 <file path=customXml/itemProps2.xml><?xml version="1.0" encoding="utf-8"?>
+<ds:datastoreItem xmlns:ds="http://schemas.openxmlformats.org/officeDocument/2006/customXml" ds:itemID="{7EE8C63A-4744-4DE4-BB49-0FF0B5375C60}">
+  <ds:schemaRefs>
+    <ds:schemaRef ds:uri="http://schemas.microsoft.com/sharepoint/v3/contenttype/forms"/>
+  </ds:schemaRefs>
+</ds:datastoreItem>
+</file>
+
+<file path=customXml/itemProps3.xml><?xml version="1.0" encoding="utf-8"?>
 <ds:datastoreItem xmlns:ds="http://schemas.openxmlformats.org/officeDocument/2006/customXml" ds:itemID="{950072C5-DDE0-4258-BA7A-4D4B80DFA632}">
   <ds:schemaRefs>
     <ds:schemaRef ds:uri="http://schemas.microsoft.com/office/infopath/2007/PartnerControls"/>
@@ -13285,12 +13288,4 @@
     <ds:schemaRef ds:uri="http://purl.org/dc/dcmitype/"/>
   </ds:schemaRefs>
 </ds:datastoreItem>
-</file>
-
-<file path=customXml/itemProps3.xml><?xml version="1.0" encoding="utf-8"?>
-<ds:datastoreItem xmlns:ds="http://schemas.openxmlformats.org/officeDocument/2006/customXml" ds:itemID="{7EE8C63A-4744-4DE4-BB49-0FF0B5375C60}">
-  <ds:schemaRefs>
-    <ds:schemaRef ds:uri="http://schemas.microsoft.com/sharepoint/v3/contenttype/forms"/>
-  </ds:schemaRefs>
-</ds:datastoreItem>
 </file>
</xml_diff>